<commit_message>
Powerpoint format small fix
</commit_message>
<xml_diff>
--- a/Funktionale_Programmierung-Artner_Dedinak.pptx
+++ b/Funktionale_Programmierung-Artner_Dedinak.pptx
@@ -19,15 +19,6 @@
   </p:sldIdLst>
   <p:sldSz cx="9144000" cy="5143500" type="screen16x9"/>
   <p:notesSz cx="6858000" cy="9144000"/>
-  <p:embeddedFontLst>
-    <p:embeddedFont>
-      <p:font typeface="Roboto Mono" panose="00000009000000000000" pitchFamily="49" charset="0"/>
-      <p:regular r:id="rId11"/>
-      <p:bold r:id="rId12"/>
-      <p:italic r:id="rId13"/>
-      <p:boldItalic r:id="rId14"/>
-    </p:embeddedFont>
-  </p:embeddedFontLst>
   <p:defaultTextStyle>
     <a:defPPr marR="0" lvl="0" algn="l" rtl="0">
       <a:lnSpc>
@@ -6699,13 +6690,16 @@
             </a:r>
           </a:p>
           <a:p>
-            <a:pPr lvl="1">
+            <a:pPr lvl="1" indent="-342900">
               <a:spcBef>
                 <a:spcPts val="1200"/>
               </a:spcBef>
               <a:buClr>
                 <a:schemeClr val="dk1"/>
               </a:buClr>
+              <a:buSzPts val="1800"/>
+              <a:buFont typeface="Arial"/>
+              <a:buChar char="●"/>
             </a:pPr>
             <a:r>
               <a:rPr lang="de-DE" dirty="0">
@@ -6715,26 +6709,14 @@
                 <a:latin typeface="+mn-lt"/>
                 <a:sym typeface="Roboto Mono"/>
               </a:rPr>
-              <a:t>p=</a:t>
-            </a:r>
-            <a:r>
-              <a:rPr lang="de-DE" dirty="0">
-                <a:solidFill>
-                  <a:schemeClr val="tx1"/>
-                </a:solidFill>
-                <a:ea typeface="Roboto Mono"/>
-                <a:cs typeface="Roboto Mono"/>
-                <a:sym typeface="Roboto Mono"/>
-              </a:rPr>
-              <a:t>&gt; </a:t>
+              <a:t>p=&gt; </a:t>
             </a:r>
             <a:r>
               <a:rPr lang="de-DE" dirty="0" err="1">
                 <a:solidFill>
                   <a:schemeClr val="tx1"/>
                 </a:solidFill>
-                <a:ea typeface="Roboto Mono"/>
-                <a:cs typeface="Roboto Mono"/>
+                <a:latin typeface="+mn-lt"/>
                 <a:sym typeface="Roboto Mono"/>
               </a:rPr>
               <a:t>drawPolygon</a:t>
@@ -6743,8 +6725,7 @@
               <a:solidFill>
                 <a:schemeClr val="tx1"/>
               </a:solidFill>
-              <a:ea typeface="Roboto Mono"/>
-              <a:cs typeface="Roboto Mono"/>
+              <a:latin typeface="+mn-lt"/>
               <a:sym typeface="Roboto Mono"/>
             </a:endParaRPr>
           </a:p>

</xml_diff>